<commit_message>
Update CSC3007 information visualization  Milestone one.pptx
</commit_message>
<xml_diff>
--- a/CSC3007 information visualization  Milestone one.pptx
+++ b/CSC3007 information visualization  Milestone one.pptx
@@ -5,7 +5,7 @@
     <p:sldMasterId id="2147483648" r:id="rId4"/>
   </p:sldMasterIdLst>
   <p:notesMasterIdLst>
-    <p:notesMasterId r:id="rId14"/>
+    <p:notesMasterId r:id="rId16"/>
   </p:notesMasterIdLst>
   <p:sldIdLst>
     <p:sldId id="256" r:id="rId5"/>
@@ -15,8 +15,10 @@
     <p:sldId id="265" r:id="rId9"/>
     <p:sldId id="260" r:id="rId10"/>
     <p:sldId id="258" r:id="rId11"/>
-    <p:sldId id="266" r:id="rId12"/>
-    <p:sldId id="262" r:id="rId13"/>
+    <p:sldId id="268" r:id="rId12"/>
+    <p:sldId id="270" r:id="rId13"/>
+    <p:sldId id="266" r:id="rId14"/>
+    <p:sldId id="262" r:id="rId15"/>
   </p:sldIdLst>
   <p:sldSz cx="12192000" cy="6858000"/>
   <p:notesSz cx="6858000" cy="9144000"/>
@@ -205,7 +207,7 @@
           <a:p>
             <a:fld id="{EDE0A0D5-8F98-4CC1-A28E-021F0B6B475C}" type="datetimeFigureOut">
               <a:rPr lang="en-US" smtClean="0"/>
-              <a:t>6/30/2022</a:t>
+              <a:t>7/6/2022</a:t>
             </a:fld>
             <a:endParaRPr lang="en-US" dirty="0"/>
           </a:p>
@@ -771,6 +773,90 @@
 </p:notes>
 </file>
 
+<file path=ppt/notesSlides/notesSlide4.xml><?xml version="1.0" encoding="utf-8"?>
+<p:notes xmlns:a="http://schemas.openxmlformats.org/drawingml/2006/main" xmlns:r="http://schemas.openxmlformats.org/officeDocument/2006/relationships" xmlns:p="http://schemas.openxmlformats.org/presentationml/2006/main">
+  <p:cSld>
+    <p:spTree>
+      <p:nvGrpSpPr>
+        <p:cNvPr id="1" name=""/>
+        <p:cNvGrpSpPr/>
+        <p:nvPr/>
+      </p:nvGrpSpPr>
+      <p:grpSpPr>
+        <a:xfrm>
+          <a:off x="0" y="0"/>
+          <a:ext cx="0" cy="0"/>
+          <a:chOff x="0" y="0"/>
+          <a:chExt cx="0" cy="0"/>
+        </a:xfrm>
+      </p:grpSpPr>
+      <p:sp>
+        <p:nvSpPr>
+          <p:cNvPr id="2" name="Slide Image Placeholder 1"/>
+          <p:cNvSpPr>
+            <a:spLocks noGrp="1" noRot="1" noChangeAspect="1"/>
+          </p:cNvSpPr>
+          <p:nvPr>
+            <p:ph type="sldImg"/>
+          </p:nvPr>
+        </p:nvSpPr>
+        <p:spPr/>
+      </p:sp>
+      <p:sp>
+        <p:nvSpPr>
+          <p:cNvPr id="3" name="Notes Placeholder 2"/>
+          <p:cNvSpPr>
+            <a:spLocks noGrp="1"/>
+          </p:cNvSpPr>
+          <p:nvPr>
+            <p:ph type="body" idx="1"/>
+          </p:nvPr>
+        </p:nvSpPr>
+        <p:spPr/>
+        <p:txBody>
+          <a:bodyPr/>
+          <a:lstStyle/>
+          <a:p>
+            <a:endParaRPr lang="en-SG" dirty="0"/>
+          </a:p>
+        </p:txBody>
+      </p:sp>
+      <p:sp>
+        <p:nvSpPr>
+          <p:cNvPr id="4" name="Slide Number Placeholder 3"/>
+          <p:cNvSpPr>
+            <a:spLocks noGrp="1"/>
+          </p:cNvSpPr>
+          <p:nvPr>
+            <p:ph type="sldNum" sz="quarter" idx="5"/>
+          </p:nvPr>
+        </p:nvSpPr>
+        <p:spPr/>
+        <p:txBody>
+          <a:bodyPr/>
+          <a:lstStyle/>
+          <a:p>
+            <a:fld id="{5603C52C-5E29-41AF-BAA3-8217E886DA08}" type="slidenum">
+              <a:rPr lang="en-US" smtClean="0"/>
+              <a:t>8</a:t>
+            </a:fld>
+            <a:endParaRPr lang="en-US" dirty="0"/>
+          </a:p>
+        </p:txBody>
+      </p:sp>
+    </p:spTree>
+    <p:extLst>
+      <p:ext uri="{BB962C8B-B14F-4D97-AF65-F5344CB8AC3E}">
+        <p14:creationId xmlns:p14="http://schemas.microsoft.com/office/powerpoint/2010/main" val="2667103433"/>
+      </p:ext>
+    </p:extLst>
+  </p:cSld>
+  <p:clrMapOvr>
+    <a:masterClrMapping/>
+  </p:clrMapOvr>
+</p:notes>
+</file>
+
 <file path=ppt/slideLayouts/slideLayout1.xml><?xml version="1.0" encoding="utf-8"?>
 <p:sldLayout xmlns:a="http://schemas.openxmlformats.org/drawingml/2006/main" xmlns:r="http://schemas.openxmlformats.org/officeDocument/2006/relationships" xmlns:p="http://schemas.openxmlformats.org/presentationml/2006/main" type="title" preserve="1">
   <p:cSld name="Title Slide">
@@ -939,7 +1025,7 @@
           <a:p>
             <a:fld id="{3A750590-9F9A-443B-9295-A3931D8194B1}" type="datetime1">
               <a:rPr lang="en-US" smtClean="0"/>
-              <a:t>6/30/2022</a:t>
+              <a:t>7/6/2022</a:t>
             </a:fld>
             <a:endParaRPr lang="en-US" dirty="0"/>
           </a:p>
@@ -1200,7 +1286,7 @@
           <a:p>
             <a:fld id="{5F35805F-452B-497C-9BD6-2CDB6902F369}" type="datetime1">
               <a:rPr lang="en-US" smtClean="0"/>
-              <a:t>6/30/2022</a:t>
+              <a:t>7/6/2022</a:t>
             </a:fld>
             <a:endParaRPr lang="en-US" dirty="0"/>
           </a:p>
@@ -1425,7 +1511,7 @@
           <a:p>
             <a:fld id="{FD3F7C6B-C82D-4D42-9929-D6E7E11D9A64}" type="datetime1">
               <a:rPr lang="en-US" smtClean="0"/>
-              <a:t>6/30/2022</a:t>
+              <a:t>7/6/2022</a:t>
             </a:fld>
             <a:endParaRPr lang="en-US" dirty="0"/>
           </a:p>
@@ -1729,7 +1815,7 @@
           <a:p>
             <a:fld id="{10CF4779-62E8-4B21-A5D7-0AFB9DBD4358}" type="datetime1">
               <a:rPr lang="en-US" smtClean="0"/>
-              <a:t>6/30/2022</a:t>
+              <a:t>7/6/2022</a:t>
             </a:fld>
             <a:endParaRPr lang="en-US" dirty="0"/>
           </a:p>
@@ -2196,7 +2282,7 @@
           <a:p>
             <a:fld id="{5F9D3375-5CD0-4576-BF96-ADFF24726FF8}" type="datetime1">
               <a:rPr lang="en-US" smtClean="0"/>
-              <a:t>6/30/2022</a:t>
+              <a:t>7/6/2022</a:t>
             </a:fld>
             <a:endParaRPr lang="en-US" dirty="0"/>
           </a:p>
@@ -2737,7 +2823,7 @@
           <a:p>
             <a:fld id="{6FACD1F8-971E-4F8C-8737-750C12E93E08}" type="datetime1">
               <a:rPr lang="en-US" smtClean="0"/>
-              <a:t>6/30/2022</a:t>
+              <a:t>7/6/2022</a:t>
             </a:fld>
             <a:endParaRPr lang="en-US" dirty="0"/>
           </a:p>
@@ -3505,7 +3591,7 @@
           <a:p>
             <a:fld id="{2C7D1621-FA30-4D98-85E5-1409E6BEECDC}" type="datetime1">
               <a:rPr lang="en-US" smtClean="0"/>
-              <a:t>6/30/2022</a:t>
+              <a:t>7/6/2022</a:t>
             </a:fld>
             <a:endParaRPr lang="en-US" dirty="0"/>
           </a:p>
@@ -3673,7 +3759,7 @@
           <a:p>
             <a:fld id="{1F96F347-1B2F-4097-AEB5-4A26FB45D67A}" type="datetime1">
               <a:rPr lang="en-US" smtClean="0"/>
-              <a:t>6/30/2022</a:t>
+              <a:t>7/6/2022</a:t>
             </a:fld>
             <a:endParaRPr lang="en-US" dirty="0"/>
           </a:p>
@@ -3889,7 +3975,7 @@
           <a:p>
             <a:fld id="{8CC1DEE0-34E5-4E0F-BEC1-4B8835F82CD1}" type="datetime1">
               <a:rPr lang="en-US" smtClean="0"/>
-              <a:t>6/30/2022</a:t>
+              <a:t>7/6/2022</a:t>
             </a:fld>
             <a:endParaRPr lang="en-US" dirty="0"/>
           </a:p>
@@ -4062,7 +4148,7 @@
           <a:p>
             <a:fld id="{3B75B4BE-627A-4EC1-99E1-6F1AA97AB802}" type="datetime1">
               <a:rPr lang="en-US" smtClean="0"/>
-              <a:t>6/30/2022</a:t>
+              <a:t>7/6/2022</a:t>
             </a:fld>
             <a:endParaRPr lang="en-US" dirty="0"/>
           </a:p>
@@ -4345,7 +4431,7 @@
           <a:p>
             <a:fld id="{78BFACF8-E63D-4673-A128-83547867BB7A}" type="datetime1">
               <a:rPr lang="en-US" smtClean="0"/>
-              <a:t>6/30/2022</a:t>
+              <a:t>7/6/2022</a:t>
             </a:fld>
             <a:endParaRPr lang="en-US" dirty="0"/>
           </a:p>
@@ -4579,7 +4665,7 @@
           <a:p>
             <a:fld id="{15BED6AC-4FBA-40BD-BE75-20DB64DA4BAD}" type="datetime1">
               <a:rPr lang="en-US" smtClean="0"/>
-              <a:t>6/30/2022</a:t>
+              <a:t>7/6/2022</a:t>
             </a:fld>
             <a:endParaRPr lang="en-US" dirty="0"/>
           </a:p>
@@ -4950,7 +5036,7 @@
           <a:p>
             <a:fld id="{3F933C87-D201-458A-93C0-8EDD9AC92D93}" type="datetime1">
               <a:rPr lang="en-US" smtClean="0"/>
-              <a:t>6/30/2022</a:t>
+              <a:t>7/6/2022</a:t>
             </a:fld>
             <a:endParaRPr lang="en-US" dirty="0"/>
           </a:p>
@@ -5062,7 +5148,7 @@
           <a:p>
             <a:fld id="{76CE6829-5A25-485A-91B1-5D6D58BB9F23}" type="datetime1">
               <a:rPr lang="en-US" smtClean="0"/>
-              <a:t>6/30/2022</a:t>
+              <a:t>7/6/2022</a:t>
             </a:fld>
             <a:endParaRPr lang="en-US" dirty="0"/>
           </a:p>
@@ -5152,7 +5238,7 @@
           <a:p>
             <a:fld id="{9912F5CD-23D0-4DD1-85B1-71F1825FB3EC}" type="datetime1">
               <a:rPr lang="en-US" smtClean="0"/>
-              <a:t>6/30/2022</a:t>
+              <a:t>7/6/2022</a:t>
             </a:fld>
             <a:endParaRPr lang="en-US" dirty="0"/>
           </a:p>
@@ -5394,7 +5480,7 @@
           <a:p>
             <a:fld id="{38BA5035-C284-496A-B076-BA73A8FA5D8B}" type="datetime1">
               <a:rPr lang="en-US" smtClean="0"/>
-              <a:t>6/30/2022</a:t>
+              <a:t>7/6/2022</a:t>
             </a:fld>
             <a:endParaRPr lang="en-US" dirty="0"/>
           </a:p>
@@ -5645,7 +5731,7 @@
           <a:p>
             <a:fld id="{B40EB420-1875-490A-8C4B-7AAB939FBE08}" type="datetime1">
               <a:rPr lang="en-US" smtClean="0"/>
-              <a:t>6/30/2022</a:t>
+              <a:t>7/6/2022</a:t>
             </a:fld>
             <a:endParaRPr lang="en-US" dirty="0"/>
           </a:p>
@@ -5881,7 +5967,7 @@
           <a:p>
             <a:fld id="{D9359126-4846-4E88-BDD9-5585CC877E47}" type="datetime1">
               <a:rPr lang="en-US" smtClean="0"/>
-              <a:t>6/30/2022</a:t>
+              <a:t>7/6/2022</a:t>
             </a:fld>
             <a:endParaRPr lang="en-US" dirty="0"/>
           </a:p>
@@ -6565,6 +6651,246 @@
 </p:sld>
 </file>
 
+<file path=ppt/slides/slide10.xml><?xml version="1.0" encoding="utf-8"?>
+<p:sld xmlns:a="http://schemas.openxmlformats.org/drawingml/2006/main" xmlns:r="http://schemas.openxmlformats.org/officeDocument/2006/relationships" xmlns:p="http://schemas.openxmlformats.org/presentationml/2006/main">
+  <p:cSld>
+    <p:spTree>
+      <p:nvGrpSpPr>
+        <p:cNvPr id="1" name=""/>
+        <p:cNvGrpSpPr/>
+        <p:nvPr/>
+      </p:nvGrpSpPr>
+      <p:grpSpPr>
+        <a:xfrm>
+          <a:off x="0" y="0"/>
+          <a:ext cx="0" cy="0"/>
+          <a:chOff x="0" y="0"/>
+          <a:chExt cx="0" cy="0"/>
+        </a:xfrm>
+      </p:grpSpPr>
+      <p:sp>
+        <p:nvSpPr>
+          <p:cNvPr id="2" name="Title 1">
+            <a:extLst>
+              <a:ext uri="{FF2B5EF4-FFF2-40B4-BE49-F238E27FC236}">
+                <a16:creationId xmlns:a16="http://schemas.microsoft.com/office/drawing/2014/main" id="{9AE28EC0-1E89-8181-2A3E-C86925A8BCAE}"/>
+              </a:ext>
+            </a:extLst>
+          </p:cNvPr>
+          <p:cNvSpPr>
+            <a:spLocks noGrp="1"/>
+          </p:cNvSpPr>
+          <p:nvPr>
+            <p:ph type="title"/>
+          </p:nvPr>
+        </p:nvSpPr>
+        <p:spPr>
+          <a:xfrm>
+            <a:off x="513805" y="729538"/>
+            <a:ext cx="2727960" cy="1293028"/>
+          </a:xfrm>
+        </p:spPr>
+        <p:txBody>
+          <a:bodyPr/>
+          <a:lstStyle/>
+          <a:p>
+            <a:r>
+              <a:rPr lang="en-US" dirty="0"/>
+              <a:t>Critique</a:t>
+            </a:r>
+            <a:endParaRPr lang="en-SG" dirty="0"/>
+          </a:p>
+        </p:txBody>
+      </p:sp>
+      <p:sp>
+        <p:nvSpPr>
+          <p:cNvPr id="3" name="Content Placeholder 2">
+            <a:extLst>
+              <a:ext uri="{FF2B5EF4-FFF2-40B4-BE49-F238E27FC236}">
+                <a16:creationId xmlns:a16="http://schemas.microsoft.com/office/drawing/2014/main" id="{1AB6805A-97BD-EF21-160F-6F76422972FD}"/>
+              </a:ext>
+            </a:extLst>
+          </p:cNvPr>
+          <p:cNvSpPr>
+            <a:spLocks noGrp="1"/>
+          </p:cNvSpPr>
+          <p:nvPr>
+            <p:ph idx="1"/>
+          </p:nvPr>
+        </p:nvSpPr>
+        <p:spPr/>
+        <p:txBody>
+          <a:bodyPr/>
+          <a:lstStyle/>
+          <a:p>
+            <a:r>
+              <a:rPr lang="en-US" dirty="0"/>
+              <a:t>Not all 50 states are represented</a:t>
+            </a:r>
+          </a:p>
+          <a:p>
+            <a:r>
+              <a:rPr lang="en-US" dirty="0"/>
+              <a:t>One </a:t>
+            </a:r>
+            <a:r>
+              <a:rPr lang="en-SG" dirty="0"/>
+              <a:t>colour</a:t>
+            </a:r>
+            <a:r>
+              <a:rPr lang="en-US" dirty="0"/>
+              <a:t> represents two states, violate the </a:t>
+            </a:r>
+            <a:r>
+              <a:rPr lang="en-US" dirty="0" err="1"/>
+              <a:t>colour</a:t>
+            </a:r>
+            <a:r>
+              <a:rPr lang="en-US" dirty="0"/>
+              <a:t> channel principle</a:t>
+            </a:r>
+          </a:p>
+          <a:p>
+            <a:r>
+              <a:rPr lang="en-US" dirty="0"/>
+              <a:t>Wyoming &amp; Colorado have the same outline</a:t>
+            </a:r>
+          </a:p>
+          <a:p>
+            <a:r>
+              <a:rPr lang="en-US" dirty="0"/>
+              <a:t>All the bar graphs look similar</a:t>
+            </a:r>
+            <a:endParaRPr lang="en-SG" dirty="0"/>
+          </a:p>
+        </p:txBody>
+      </p:sp>
+    </p:spTree>
+    <p:extLst>
+      <p:ext uri="{BB962C8B-B14F-4D97-AF65-F5344CB8AC3E}">
+        <p14:creationId xmlns:p14="http://schemas.microsoft.com/office/powerpoint/2010/main" val="88538290"/>
+      </p:ext>
+    </p:extLst>
+  </p:cSld>
+  <p:clrMapOvr>
+    <a:masterClrMapping/>
+  </p:clrMapOvr>
+</p:sld>
+</file>
+
+<file path=ppt/slides/slide11.xml><?xml version="1.0" encoding="utf-8"?>
+<p:sld xmlns:a="http://schemas.openxmlformats.org/drawingml/2006/main" xmlns:r="http://schemas.openxmlformats.org/officeDocument/2006/relationships" xmlns:p="http://schemas.openxmlformats.org/presentationml/2006/main">
+  <p:cSld>
+    <p:spTree>
+      <p:nvGrpSpPr>
+        <p:cNvPr id="1" name=""/>
+        <p:cNvGrpSpPr/>
+        <p:nvPr/>
+      </p:nvGrpSpPr>
+      <p:grpSpPr>
+        <a:xfrm>
+          <a:off x="0" y="0"/>
+          <a:ext cx="0" cy="0"/>
+          <a:chOff x="0" y="0"/>
+          <a:chExt cx="0" cy="0"/>
+        </a:xfrm>
+      </p:grpSpPr>
+      <p:sp>
+        <p:nvSpPr>
+          <p:cNvPr id="2" name="Title 1">
+            <a:extLst>
+              <a:ext uri="{FF2B5EF4-FFF2-40B4-BE49-F238E27FC236}">
+                <a16:creationId xmlns:a16="http://schemas.microsoft.com/office/drawing/2014/main" id="{A389EA88-8D83-4F3F-A4C1-4B16E2377F9E}"/>
+              </a:ext>
+            </a:extLst>
+          </p:cNvPr>
+          <p:cNvSpPr>
+            <a:spLocks noGrp="1"/>
+          </p:cNvSpPr>
+          <p:nvPr>
+            <p:ph type="title"/>
+          </p:nvPr>
+        </p:nvSpPr>
+        <p:spPr>
+          <a:xfrm>
+            <a:off x="1599856" y="284800"/>
+            <a:ext cx="8188578" cy="1474330"/>
+          </a:xfrm>
+        </p:spPr>
+        <p:txBody>
+          <a:bodyPr>
+            <a:normAutofit/>
+          </a:bodyPr>
+          <a:lstStyle/>
+          <a:p>
+            <a:pPr algn="ctr"/>
+            <a:r>
+              <a:rPr lang="en-US" dirty="0"/>
+              <a:t>Visualization two: suggestion</a:t>
+            </a:r>
+          </a:p>
+        </p:txBody>
+      </p:sp>
+      <p:pic>
+        <p:nvPicPr>
+          <p:cNvPr id="5122" name="Picture 2">
+            <a:extLst>
+              <a:ext uri="{FF2B5EF4-FFF2-40B4-BE49-F238E27FC236}">
+                <a16:creationId xmlns:a16="http://schemas.microsoft.com/office/drawing/2014/main" id="{2DCC959A-080E-4D17-3C17-33F75ED6AE84}"/>
+              </a:ext>
+            </a:extLst>
+          </p:cNvPr>
+          <p:cNvPicPr>
+            <a:picLocks noChangeAspect="1" noChangeArrowheads="1"/>
+          </p:cNvPicPr>
+          <p:nvPr/>
+        </p:nvPicPr>
+        <p:blipFill>
+          <a:blip r:embed="rId2">
+            <a:extLst>
+              <a:ext uri="{28A0092B-C50C-407E-A947-70E740481C1C}">
+                <a14:useLocalDpi xmlns:a14="http://schemas.microsoft.com/office/drawing/2010/main" val="0"/>
+              </a:ext>
+            </a:extLst>
+          </a:blip>
+          <a:srcRect/>
+          <a:stretch>
+            <a:fillRect/>
+          </a:stretch>
+        </p:blipFill>
+        <p:spPr bwMode="auto">
+          <a:xfrm>
+            <a:off x="1599856" y="1552521"/>
+            <a:ext cx="8523175" cy="5099739"/>
+          </a:xfrm>
+          <a:prstGeom prst="rect">
+            <a:avLst/>
+          </a:prstGeom>
+          <a:noFill/>
+          <a:extLst>
+            <a:ext uri="{909E8E84-426E-40DD-AFC4-6F175D3DCCD1}">
+              <a14:hiddenFill xmlns:a14="http://schemas.microsoft.com/office/drawing/2010/main">
+                <a:solidFill>
+                  <a:srgbClr val="FFFFFF"/>
+                </a:solidFill>
+              </a14:hiddenFill>
+            </a:ext>
+          </a:extLst>
+        </p:spPr>
+      </p:pic>
+    </p:spTree>
+    <p:extLst>
+      <p:ext uri="{BB962C8B-B14F-4D97-AF65-F5344CB8AC3E}">
+        <p14:creationId xmlns:p14="http://schemas.microsoft.com/office/powerpoint/2010/main" val="4090842148"/>
+      </p:ext>
+    </p:extLst>
+  </p:cSld>
+  <p:clrMapOvr>
+    <a:masterClrMapping/>
+  </p:clrMapOvr>
+</p:sld>
+</file>
+
 <file path=ppt/slides/slide2.xml><?xml version="1.0" encoding="utf-8"?>
 <p:sld xmlns:a="http://schemas.openxmlformats.org/drawingml/2006/main" xmlns:r="http://schemas.openxmlformats.org/officeDocument/2006/relationships" xmlns:p="http://schemas.openxmlformats.org/presentationml/2006/main">
   <p:cSld>
@@ -6723,7 +7049,7 @@
             <a:pPr algn="l"/>
             <a:r>
               <a:rPr lang="en-US" dirty="0"/>
-              <a:t>task</a:t>
+              <a:t>Data</a:t>
             </a:r>
             <a:endParaRPr lang="en-SG" dirty="0"/>
           </a:p>
@@ -6757,15 +7083,14 @@
           <a:p>
             <a:r>
               <a:rPr lang="en-US" dirty="0"/>
-              <a:t>Evaluate the most common password</a:t>
+              <a:t>Categories of Commonly Used Password</a:t>
             </a:r>
           </a:p>
           <a:p>
             <a:r>
               <a:rPr lang="en-US" dirty="0"/>
-              <a:t>Educate user on security aspect when choosing an unique password</a:t>
-            </a:r>
-            <a:endParaRPr lang="en-SG" dirty="0"/>
+              <a:t>Percentage of Total Password Used in that category</a:t>
+            </a:r>
           </a:p>
         </p:txBody>
       </p:sp>
@@ -6815,11 +7140,17 @@
             <p:ph type="title"/>
           </p:nvPr>
         </p:nvSpPr>
-        <p:spPr/>
+        <p:spPr>
+          <a:xfrm>
+            <a:off x="685800" y="901532"/>
+            <a:ext cx="8610600" cy="1293028"/>
+          </a:xfrm>
+        </p:spPr>
         <p:txBody>
           <a:bodyPr/>
           <a:lstStyle/>
           <a:p>
+            <a:pPr algn="l"/>
             <a:r>
               <a:rPr lang="en-US" dirty="0"/>
               <a:t>Idiom</a:t>
@@ -6851,14 +7182,25 @@
           <a:p>
             <a:r>
               <a:rPr lang="en-US" dirty="0"/>
+              <a:t>Horizontal Bar chart is used to show the common categories of password</a:t>
+            </a:r>
+          </a:p>
+          <a:p>
+            <a:r>
+              <a:rPr lang="en-US" dirty="0"/>
               <a:t>Color is used to identify different category of the common password</a:t>
             </a:r>
           </a:p>
           <a:p>
             <a:r>
               <a:rPr lang="en-US" dirty="0"/>
-              <a:t>Bar include quantitative results to indicate the number of frequently used password</a:t>
-            </a:r>
+              <a:t>Quantitative results uses percentages to indicate the number of frequently used password</a:t>
+            </a:r>
+          </a:p>
+          <a:p>
+            <a:endParaRPr lang="en-US" dirty="0"/>
+          </a:p>
+          <a:p>
             <a:endParaRPr lang="en-SG" dirty="0"/>
           </a:p>
         </p:txBody>
@@ -6959,6 +7301,20 @@
               <a:t>Colour Scheme used is similar leading to confusion (Truly Random &amp; Rebellious)</a:t>
             </a:r>
           </a:p>
+          <a:p>
+            <a:r>
+              <a:rPr lang="en-SG" dirty="0"/>
+              <a:t>Some categories contains sub-categories (</a:t>
+            </a:r>
+            <a:r>
+              <a:rPr lang="en-SG" dirty="0" err="1"/>
+              <a:t>i.e</a:t>
+            </a:r>
+            <a:r>
+              <a:rPr lang="en-SG" dirty="0"/>
+              <a:t> nerdy/pop)</a:t>
+            </a:r>
+          </a:p>
         </p:txBody>
       </p:sp>
     </p:spTree>
@@ -7030,49 +7386,32 @@
       </p:sp>
       <p:pic>
         <p:nvPicPr>
-          <p:cNvPr id="4098" name="Picture 2">
+          <p:cNvPr id="4" name="Picture 3" descr="Graphical user interface, application&#10;&#10;Description automatically generated">
             <a:extLst>
               <a:ext uri="{FF2B5EF4-FFF2-40B4-BE49-F238E27FC236}">
-                <a16:creationId xmlns:a16="http://schemas.microsoft.com/office/drawing/2014/main" id="{6B7C5266-1790-3F16-64FB-818BF62B4720}"/>
+                <a16:creationId xmlns:a16="http://schemas.microsoft.com/office/drawing/2014/main" id="{148D3B5F-8FF6-4C8F-9E1D-3BD8817AA66E}"/>
               </a:ext>
             </a:extLst>
           </p:cNvPr>
           <p:cNvPicPr>
-            <a:picLocks noChangeAspect="1" noChangeArrowheads="1"/>
+            <a:picLocks noChangeAspect="1"/>
           </p:cNvPicPr>
           <p:nvPr/>
         </p:nvPicPr>
         <p:blipFill>
-          <a:blip r:embed="rId2">
-            <a:extLst>
-              <a:ext uri="{28A0092B-C50C-407E-A947-70E740481C1C}">
-                <a14:useLocalDpi xmlns:a14="http://schemas.microsoft.com/office/drawing/2010/main" val="0"/>
-              </a:ext>
-            </a:extLst>
-          </a:blip>
-          <a:srcRect/>
+          <a:blip r:embed="rId2"/>
           <a:stretch>
             <a:fillRect/>
           </a:stretch>
         </p:blipFill>
-        <p:spPr bwMode="auto">
-          <a:xfrm>
-            <a:off x="1217022" y="1806484"/>
-            <a:ext cx="10094554" cy="4594316"/>
+        <p:spPr>
+          <a:xfrm>
+            <a:off x="2032000" y="1631950"/>
+            <a:ext cx="8128000" cy="3594100"/>
           </a:xfrm>
           <a:prstGeom prst="rect">
             <a:avLst/>
           </a:prstGeom>
-          <a:noFill/>
-          <a:extLst>
-            <a:ext uri="{909E8E84-426E-40DD-AFC4-6F175D3DCCD1}">
-              <a14:hiddenFill xmlns:a14="http://schemas.microsoft.com/office/drawing/2010/main">
-                <a:solidFill>
-                  <a:srgbClr val="FFFFFF"/>
-                </a:solidFill>
-              </a14:hiddenFill>
-            </a:ext>
-          </a:extLst>
         </p:spPr>
       </p:pic>
     </p:spTree>
@@ -7202,7 +7541,7 @@
 </file>
 
 <file path=ppt/slides/slide8.xml><?xml version="1.0" encoding="utf-8"?>
-<p:sld xmlns:a="http://schemas.openxmlformats.org/drawingml/2006/main" xmlns:r="http://schemas.openxmlformats.org/officeDocument/2006/relationships" xmlns:p="http://schemas.openxmlformats.org/presentationml/2006/main">
+<p:sld xmlns:a="http://schemas.openxmlformats.org/drawingml/2006/main" xmlns:r="http://schemas.openxmlformats.org/officeDocument/2006/relationships" xmlns:p="http://schemas.openxmlformats.org/presentationml/2006/main" show="0">
   <p:cSld>
     <p:spTree>
       <p:nvGrpSpPr>
@@ -7223,7 +7562,7 @@
           <p:cNvPr id="2" name="Title 1">
             <a:extLst>
               <a:ext uri="{FF2B5EF4-FFF2-40B4-BE49-F238E27FC236}">
-                <a16:creationId xmlns:a16="http://schemas.microsoft.com/office/drawing/2014/main" id="{9AE28EC0-1E89-8181-2A3E-C86925A8BCAE}"/>
+                <a16:creationId xmlns:a16="http://schemas.microsoft.com/office/drawing/2014/main" id="{C28232DC-6A7B-35CF-263D-C23F64BAFEC1}"/>
               </a:ext>
             </a:extLst>
           </p:cNvPr>
@@ -7236,17 +7575,18 @@
         </p:nvSpPr>
         <p:spPr>
           <a:xfrm>
-            <a:off x="513805" y="729538"/>
-            <a:ext cx="2727960" cy="1293028"/>
+            <a:off x="685800" y="746955"/>
+            <a:ext cx="8610600" cy="1293028"/>
           </a:xfrm>
         </p:spPr>
         <p:txBody>
           <a:bodyPr/>
           <a:lstStyle/>
           <a:p>
+            <a:pPr algn="l"/>
             <a:r>
               <a:rPr lang="en-US" dirty="0"/>
-              <a:t>Critique</a:t>
+              <a:t>Data</a:t>
             </a:r>
             <a:endParaRPr lang="en-SG" dirty="0"/>
           </a:p>
@@ -7257,7 +7597,7 @@
           <p:cNvPr id="3" name="Content Placeholder 2">
             <a:extLst>
               <a:ext uri="{FF2B5EF4-FFF2-40B4-BE49-F238E27FC236}">
-                <a16:creationId xmlns:a16="http://schemas.microsoft.com/office/drawing/2014/main" id="{1AB6805A-97BD-EF21-160F-6F76422972FD}"/>
+                <a16:creationId xmlns:a16="http://schemas.microsoft.com/office/drawing/2014/main" id="{1974B0CE-3A67-C7EE-FF75-6A8D8BBC36C7}"/>
               </a:ext>
             </a:extLst>
           </p:cNvPr>
@@ -7268,57 +7608,33 @@
             <p:ph idx="1"/>
           </p:nvPr>
         </p:nvSpPr>
-        <p:spPr/>
+        <p:spPr>
+          <a:xfrm>
+            <a:off x="685800" y="2194561"/>
+            <a:ext cx="10820400" cy="1234440"/>
+          </a:xfrm>
+        </p:spPr>
         <p:txBody>
           <a:bodyPr/>
           <a:lstStyle/>
           <a:p>
             <a:r>
               <a:rPr lang="en-US" dirty="0"/>
-              <a:t>Not all 50 states are represented</a:t>
+              <a:t>Percentage of Husband Wife Households with children under 18</a:t>
             </a:r>
           </a:p>
           <a:p>
             <a:r>
               <a:rPr lang="en-US" dirty="0"/>
-              <a:t>One </a:t>
-            </a:r>
-            <a:r>
-              <a:rPr lang="en-US" dirty="0" err="1"/>
-              <a:t>colour</a:t>
-            </a:r>
-            <a:r>
-              <a:rPr lang="en-US" dirty="0"/>
-              <a:t> represents two states, violate the </a:t>
-            </a:r>
-            <a:r>
-              <a:rPr lang="en-US" dirty="0" err="1"/>
-              <a:t>colour</a:t>
-            </a:r>
-            <a:r>
-              <a:rPr lang="en-US" dirty="0"/>
-              <a:t> channel principle</a:t>
-            </a:r>
-          </a:p>
-          <a:p>
-            <a:r>
-              <a:rPr lang="en-US" dirty="0"/>
-              <a:t>Wyoming &amp; Colorado have the same outline</a:t>
-            </a:r>
-          </a:p>
-          <a:p>
-            <a:r>
-              <a:rPr lang="en-US" dirty="0"/>
-              <a:t>All the bar graphs look similar</a:t>
-            </a:r>
-            <a:endParaRPr lang="en-SG" dirty="0"/>
+              <a:t>Different States are represented on the map</a:t>
+            </a:r>
           </a:p>
         </p:txBody>
       </p:sp>
     </p:spTree>
     <p:extLst>
       <p:ext uri="{BB962C8B-B14F-4D97-AF65-F5344CB8AC3E}">
-        <p14:creationId xmlns:p14="http://schemas.microsoft.com/office/powerpoint/2010/main" val="88538290"/>
+        <p14:creationId xmlns:p14="http://schemas.microsoft.com/office/powerpoint/2010/main" val="177938179"/>
       </p:ext>
     </p:extLst>
   </p:cSld>
@@ -7350,7 +7666,7 @@
           <p:cNvPr id="2" name="Title 1">
             <a:extLst>
               <a:ext uri="{FF2B5EF4-FFF2-40B4-BE49-F238E27FC236}">
-                <a16:creationId xmlns:a16="http://schemas.microsoft.com/office/drawing/2014/main" id="{A389EA88-8D83-4F3F-A4C1-4B16E2377F9E}"/>
+                <a16:creationId xmlns:a16="http://schemas.microsoft.com/office/drawing/2014/main" id="{86EFEC2C-26D8-DA96-FED2-BAAF50448120}"/>
               </a:ext>
             </a:extLst>
           </p:cNvPr>
@@ -7363,75 +7679,73 @@
         </p:nvSpPr>
         <p:spPr>
           <a:xfrm>
-            <a:off x="1599856" y="284800"/>
-            <a:ext cx="8188578" cy="1474330"/>
-          </a:xfrm>
-        </p:spPr>
-        <p:txBody>
-          <a:bodyPr>
-            <a:normAutofit/>
-          </a:bodyPr>
-          <a:lstStyle/>
-          <a:p>
-            <a:pPr algn="ctr"/>
+            <a:off x="685800" y="901532"/>
+            <a:ext cx="8610600" cy="1293028"/>
+          </a:xfrm>
+        </p:spPr>
+        <p:txBody>
+          <a:bodyPr/>
+          <a:lstStyle/>
+          <a:p>
+            <a:pPr algn="l"/>
             <a:r>
               <a:rPr lang="en-US" dirty="0"/>
-              <a:t>Visualization two: suggestion</a:t>
-            </a:r>
-          </a:p>
-        </p:txBody>
-      </p:sp>
-      <p:pic>
-        <p:nvPicPr>
-          <p:cNvPr id="5122" name="Picture 2">
+              <a:t>Idiom</a:t>
+            </a:r>
+            <a:endParaRPr lang="en-SG" dirty="0"/>
+          </a:p>
+        </p:txBody>
+      </p:sp>
+      <p:sp>
+        <p:nvSpPr>
+          <p:cNvPr id="3" name="Content Placeholder 2">
             <a:extLst>
               <a:ext uri="{FF2B5EF4-FFF2-40B4-BE49-F238E27FC236}">
-                <a16:creationId xmlns:a16="http://schemas.microsoft.com/office/drawing/2014/main" id="{2DCC959A-080E-4D17-3C17-33F75ED6AE84}"/>
+                <a16:creationId xmlns:a16="http://schemas.microsoft.com/office/drawing/2014/main" id="{8E433F15-E699-A6F9-69EC-81852CE85E8A}"/>
               </a:ext>
             </a:extLst>
           </p:cNvPr>
-          <p:cNvPicPr>
-            <a:picLocks noChangeAspect="1" noChangeArrowheads="1"/>
-          </p:cNvPicPr>
-          <p:nvPr/>
-        </p:nvPicPr>
-        <p:blipFill>
-          <a:blip r:embed="rId2">
-            <a:extLst>
-              <a:ext uri="{28A0092B-C50C-407E-A947-70E740481C1C}">
-                <a14:useLocalDpi xmlns:a14="http://schemas.microsoft.com/office/drawing/2010/main" val="0"/>
-              </a:ext>
-            </a:extLst>
-          </a:blip>
-          <a:srcRect/>
-          <a:stretch>
-            <a:fillRect/>
-          </a:stretch>
-        </p:blipFill>
-        <p:spPr bwMode="auto">
-          <a:xfrm>
-            <a:off x="1599856" y="1552521"/>
-            <a:ext cx="8523175" cy="5099739"/>
-          </a:xfrm>
-          <a:prstGeom prst="rect">
-            <a:avLst/>
-          </a:prstGeom>
-          <a:noFill/>
-          <a:extLst>
-            <a:ext uri="{909E8E84-426E-40DD-AFC4-6F175D3DCCD1}">
-              <a14:hiddenFill xmlns:a14="http://schemas.microsoft.com/office/drawing/2010/main">
-                <a:solidFill>
-                  <a:srgbClr val="FFFFFF"/>
-                </a:solidFill>
-              </a14:hiddenFill>
-            </a:ext>
-          </a:extLst>
-        </p:spPr>
-      </p:pic>
+          <p:cNvSpPr>
+            <a:spLocks noGrp="1"/>
+          </p:cNvSpPr>
+          <p:nvPr>
+            <p:ph idx="1"/>
+          </p:nvPr>
+        </p:nvSpPr>
+        <p:spPr/>
+        <p:txBody>
+          <a:bodyPr/>
+          <a:lstStyle/>
+          <a:p>
+            <a:r>
+              <a:rPr lang="en-SG" dirty="0"/>
+              <a:t>Percentages to represent the percentage of Husband Wife Households with children under 18</a:t>
+            </a:r>
+          </a:p>
+          <a:p>
+            <a:r>
+              <a:rPr lang="en-SG" dirty="0"/>
+              <a:t>Horizontal Bar Chart to represent the percentage of Husband Wife Households with children under 18</a:t>
+            </a:r>
+          </a:p>
+          <a:p>
+            <a:r>
+              <a:rPr lang="en-SG" dirty="0"/>
+              <a:t>Outline of the States to represent various states in the US</a:t>
+            </a:r>
+          </a:p>
+          <a:p>
+            <a:pPr marL="0" indent="0">
+              <a:buNone/>
+            </a:pPr>
+            <a:endParaRPr lang="en-SG" dirty="0"/>
+          </a:p>
+        </p:txBody>
+      </p:sp>
     </p:spTree>
     <p:extLst>
       <p:ext uri="{BB962C8B-B14F-4D97-AF65-F5344CB8AC3E}">
-        <p14:creationId xmlns:p14="http://schemas.microsoft.com/office/powerpoint/2010/main" val="4090842148"/>
+        <p14:creationId xmlns:p14="http://schemas.microsoft.com/office/powerpoint/2010/main" val="266992750"/>
       </p:ext>
     </p:extLst>
   </p:cSld>
@@ -8007,23 +8321,6 @@
 </file>
 
 <file path=customXml/item1.xml><?xml version="1.0" encoding="utf-8"?>
-<p:properties xmlns:p="http://schemas.microsoft.com/office/2006/metadata/properties" xmlns:xsi="http://www.w3.org/2001/XMLSchema-instance" xmlns:pc="http://schemas.microsoft.com/office/infopath/2007/PartnerControls">
-  <documentManagement>
-    <MediaServiceKeyPoints xmlns="71af3243-3dd4-4a8d-8c0d-dd76da1f02a5" xsi:nil="true"/>
-  </documentManagement>
-</p:properties>
-</file>
-
-<file path=customXml/item2.xml><?xml version="1.0" encoding="utf-8"?>
-<?mso-contentType ?>
-<FormTemplates xmlns="http://schemas.microsoft.com/sharepoint/v3/contenttype/forms">
-  <Display>DocumentLibraryForm</Display>
-  <Edit>DocumentLibraryForm</Edit>
-  <New>DocumentLibraryForm</New>
-</FormTemplates>
-</file>
-
-<file path=customXml/item3.xml><?xml version="1.0" encoding="utf-8"?>
 <ct:contentTypeSchema xmlns:ct="http://schemas.microsoft.com/office/2006/metadata/contentType" xmlns:ma="http://schemas.microsoft.com/office/2006/metadata/properties/metaAttributes" ct:_="" ma:_="" ma:contentTypeName="Document" ma:contentTypeID="0x01010079F111ED35F8CC479449609E8A0923A6" ma:contentTypeVersion="11" ma:contentTypeDescription="Create a new document." ma:contentTypeScope="" ma:versionID="9677210f24a1be23c92c90fd886aa0aa">
   <xsd:schema xmlns:xsd="http://www.w3.org/2001/XMLSchema" xmlns:xs="http://www.w3.org/2001/XMLSchema" xmlns:p="http://schemas.microsoft.com/office/2006/metadata/properties" xmlns:ns2="71af3243-3dd4-4a8d-8c0d-dd76da1f02a5" xmlns:ns3="16c05727-aa75-4e4a-9b5f-8a80a1165891" targetNamespace="http://schemas.microsoft.com/office/2006/metadata/properties" ma:root="true" ma:fieldsID="60e05723c5c1908df1a1a4ebf11d344e" ns2:_="" ns3:_="">
     <xsd:import namespace="71af3243-3dd4-4a8d-8c0d-dd76da1f02a5"/>
@@ -8234,25 +8531,24 @@
 </ct:contentTypeSchema>
 </file>
 
-<file path=customXml/itemProps1.xml><?xml version="1.0" encoding="utf-8"?>
-<ds:datastoreItem xmlns:ds="http://schemas.openxmlformats.org/officeDocument/2006/customXml" ds:itemID="{4710EE66-8707-456F-8F2E-091D581CB030}">
-  <ds:schemaRefs>
-    <ds:schemaRef ds:uri="http://schemas.microsoft.com/office/2006/metadata/properties"/>
-    <ds:schemaRef ds:uri="http://schemas.microsoft.com/office/infopath/2007/PartnerControls"/>
-    <ds:schemaRef ds:uri="71af3243-3dd4-4a8d-8c0d-dd76da1f02a5"/>
-  </ds:schemaRefs>
-</ds:datastoreItem>
+<file path=customXml/item2.xml><?xml version="1.0" encoding="utf-8"?>
+<?mso-contentType ?>
+<FormTemplates xmlns="http://schemas.microsoft.com/sharepoint/v3/contenttype/forms">
+  <Display>DocumentLibraryForm</Display>
+  <Edit>DocumentLibraryForm</Edit>
+  <New>DocumentLibraryForm</New>
+</FormTemplates>
 </file>
 
-<file path=customXml/itemProps2.xml><?xml version="1.0" encoding="utf-8"?>
-<ds:datastoreItem xmlns:ds="http://schemas.openxmlformats.org/officeDocument/2006/customXml" ds:itemID="{10BEB954-4024-4CCF-A9D6-4C00FDC028D9}">
-  <ds:schemaRefs>
-    <ds:schemaRef ds:uri="http://schemas.microsoft.com/sharepoint/v3/contenttype/forms"/>
-  </ds:schemaRefs>
-</ds:datastoreItem>
+<file path=customXml/item3.xml><?xml version="1.0" encoding="utf-8"?>
+<p:properties xmlns:p="http://schemas.microsoft.com/office/2006/metadata/properties" xmlns:xsi="http://www.w3.org/2001/XMLSchema-instance" xmlns:pc="http://schemas.microsoft.com/office/infopath/2007/PartnerControls">
+  <documentManagement>
+    <MediaServiceKeyPoints xmlns="71af3243-3dd4-4a8d-8c0d-dd76da1f02a5" xsi:nil="true"/>
+  </documentManagement>
+</p:properties>
 </file>
 
-<file path=customXml/itemProps3.xml><?xml version="1.0" encoding="utf-8"?>
+<file path=customXml/itemProps1.xml><?xml version="1.0" encoding="utf-8"?>
 <ds:datastoreItem xmlns:ds="http://schemas.openxmlformats.org/officeDocument/2006/customXml" ds:itemID="{AB96CC85-5758-41C0-8EFD-737AFB69121D}">
   <ds:schemaRefs>
     <ds:schemaRef ds:uri="http://schemas.microsoft.com/office/2006/metadata/contentType"/>
@@ -8269,4 +8565,22 @@
     <ds:schemaRef ds:uri="http://schemas.microsoft.com/internal/obd"/>
   </ds:schemaRefs>
 </ds:datastoreItem>
+</file>
+
+<file path=customXml/itemProps2.xml><?xml version="1.0" encoding="utf-8"?>
+<ds:datastoreItem xmlns:ds="http://schemas.openxmlformats.org/officeDocument/2006/customXml" ds:itemID="{10BEB954-4024-4CCF-A9D6-4C00FDC028D9}">
+  <ds:schemaRefs>
+    <ds:schemaRef ds:uri="http://schemas.microsoft.com/sharepoint/v3/contenttype/forms"/>
+  </ds:schemaRefs>
+</ds:datastoreItem>
+</file>
+
+<file path=customXml/itemProps3.xml><?xml version="1.0" encoding="utf-8"?>
+<ds:datastoreItem xmlns:ds="http://schemas.openxmlformats.org/officeDocument/2006/customXml" ds:itemID="{4710EE66-8707-456F-8F2E-091D581CB030}">
+  <ds:schemaRefs>
+    <ds:schemaRef ds:uri="http://schemas.microsoft.com/office/2006/metadata/properties"/>
+    <ds:schemaRef ds:uri="http://schemas.microsoft.com/office/infopath/2007/PartnerControls"/>
+    <ds:schemaRef ds:uri="71af3243-3dd4-4a8d-8c0d-dd76da1f02a5"/>
+  </ds:schemaRefs>
+</ds:datastoreItem>
 </file>
</xml_diff>